<commit_message>
Add gluco and insuline images to month overview
</commit_message>
<xml_diff>
--- a/Glucose/IconsDesign.pptx
+++ b/Glucose/IconsDesign.pptx
@@ -288,7 +288,7 @@
           <a:p>
             <a:fld id="{3758201A-D200-4743-8889-2B59EF09893E}" type="datetimeFigureOut">
               <a:rPr lang="en-US" smtClean="0"/>
-              <a:t>2/24/2014</a:t>
+              <a:t>2/25/2014</a:t>
             </a:fld>
             <a:endParaRPr lang="en-US"/>
           </a:p>
@@ -458,7 +458,7 @@
           <a:p>
             <a:fld id="{3758201A-D200-4743-8889-2B59EF09893E}" type="datetimeFigureOut">
               <a:rPr lang="en-US" smtClean="0"/>
-              <a:t>2/24/2014</a:t>
+              <a:t>2/25/2014</a:t>
             </a:fld>
             <a:endParaRPr lang="en-US"/>
           </a:p>
@@ -638,7 +638,7 @@
           <a:p>
             <a:fld id="{3758201A-D200-4743-8889-2B59EF09893E}" type="datetimeFigureOut">
               <a:rPr lang="en-US" smtClean="0"/>
-              <a:t>2/24/2014</a:t>
+              <a:t>2/25/2014</a:t>
             </a:fld>
             <a:endParaRPr lang="en-US"/>
           </a:p>
@@ -808,7 +808,7 @@
           <a:p>
             <a:fld id="{3758201A-D200-4743-8889-2B59EF09893E}" type="datetimeFigureOut">
               <a:rPr lang="en-US" smtClean="0"/>
-              <a:t>2/24/2014</a:t>
+              <a:t>2/25/2014</a:t>
             </a:fld>
             <a:endParaRPr lang="en-US"/>
           </a:p>
@@ -1054,7 +1054,7 @@
           <a:p>
             <a:fld id="{3758201A-D200-4743-8889-2B59EF09893E}" type="datetimeFigureOut">
               <a:rPr lang="en-US" smtClean="0"/>
-              <a:t>2/24/2014</a:t>
+              <a:t>2/25/2014</a:t>
             </a:fld>
             <a:endParaRPr lang="en-US"/>
           </a:p>
@@ -1342,7 +1342,7 @@
           <a:p>
             <a:fld id="{3758201A-D200-4743-8889-2B59EF09893E}" type="datetimeFigureOut">
               <a:rPr lang="en-US" smtClean="0"/>
-              <a:t>2/24/2014</a:t>
+              <a:t>2/25/2014</a:t>
             </a:fld>
             <a:endParaRPr lang="en-US"/>
           </a:p>
@@ -1764,7 +1764,7 @@
           <a:p>
             <a:fld id="{3758201A-D200-4743-8889-2B59EF09893E}" type="datetimeFigureOut">
               <a:rPr lang="en-US" smtClean="0"/>
-              <a:t>2/24/2014</a:t>
+              <a:t>2/25/2014</a:t>
             </a:fld>
             <a:endParaRPr lang="en-US"/>
           </a:p>
@@ -1882,7 +1882,7 @@
           <a:p>
             <a:fld id="{3758201A-D200-4743-8889-2B59EF09893E}" type="datetimeFigureOut">
               <a:rPr lang="en-US" smtClean="0"/>
-              <a:t>2/24/2014</a:t>
+              <a:t>2/25/2014</a:t>
             </a:fld>
             <a:endParaRPr lang="en-US"/>
           </a:p>
@@ -1977,7 +1977,7 @@
           <a:p>
             <a:fld id="{3758201A-D200-4743-8889-2B59EF09893E}" type="datetimeFigureOut">
               <a:rPr lang="en-US" smtClean="0"/>
-              <a:t>2/24/2014</a:t>
+              <a:t>2/25/2014</a:t>
             </a:fld>
             <a:endParaRPr lang="en-US"/>
           </a:p>
@@ -2254,7 +2254,7 @@
           <a:p>
             <a:fld id="{3758201A-D200-4743-8889-2B59EF09893E}" type="datetimeFigureOut">
               <a:rPr lang="en-US" smtClean="0"/>
-              <a:t>2/24/2014</a:t>
+              <a:t>2/25/2014</a:t>
             </a:fld>
             <a:endParaRPr lang="en-US"/>
           </a:p>
@@ -2507,7 +2507,7 @@
           <a:p>
             <a:fld id="{3758201A-D200-4743-8889-2B59EF09893E}" type="datetimeFigureOut">
               <a:rPr lang="en-US" smtClean="0"/>
-              <a:t>2/24/2014</a:t>
+              <a:t>2/25/2014</a:t>
             </a:fld>
             <a:endParaRPr lang="en-US"/>
           </a:p>
@@ -2720,7 +2720,7 @@
           <a:p>
             <a:fld id="{3758201A-D200-4743-8889-2B59EF09893E}" type="datetimeFigureOut">
               <a:rPr lang="en-US" smtClean="0"/>
-              <a:t>2/24/2014</a:t>
+              <a:t>2/25/2014</a:t>
             </a:fld>
             <a:endParaRPr lang="en-US"/>
           </a:p>
@@ -3095,208 +3095,6 @@
           <a:chExt cx="0" cy="0"/>
         </a:xfrm>
       </p:grpSpPr>
-      <p:grpSp>
-        <p:nvGrpSpPr>
-          <p:cNvPr id="9" name="Group 8"/>
-          <p:cNvGrpSpPr/>
-          <p:nvPr/>
-        </p:nvGrpSpPr>
-        <p:grpSpPr>
-          <a:xfrm rot="20541192">
-            <a:off x="950916" y="686118"/>
-            <a:ext cx="2939929" cy="1166069"/>
-            <a:chOff x="1371600" y="2209800"/>
-            <a:chExt cx="2939929" cy="1166069"/>
-          </a:xfrm>
-          <a:solidFill>
-            <a:schemeClr val="tx1"/>
-          </a:solidFill>
-        </p:grpSpPr>
-        <p:sp>
-          <p:nvSpPr>
-            <p:cNvPr id="4" name="Rectangle 3"/>
-            <p:cNvSpPr/>
-            <p:nvPr/>
-          </p:nvSpPr>
-          <p:spPr>
-            <a:xfrm>
-              <a:off x="1371600" y="2209800"/>
-              <a:ext cx="1447800" cy="685800"/>
-            </a:xfrm>
-            <a:prstGeom prst="rect">
-              <a:avLst/>
-            </a:prstGeom>
-            <a:grpFill/>
-            <a:ln>
-              <a:noFill/>
-            </a:ln>
-          </p:spPr>
-          <p:style>
-            <a:lnRef idx="2">
-              <a:schemeClr val="accent1">
-                <a:shade val="50000"/>
-              </a:schemeClr>
-            </a:lnRef>
-            <a:fillRef idx="1">
-              <a:schemeClr val="accent1"/>
-            </a:fillRef>
-            <a:effectRef idx="0">
-              <a:schemeClr val="accent1"/>
-            </a:effectRef>
-            <a:fontRef idx="minor">
-              <a:schemeClr val="lt1"/>
-            </a:fontRef>
-          </p:style>
-          <p:txBody>
-            <a:bodyPr rtlCol="0" anchor="ctr"/>
-            <a:lstStyle/>
-            <a:p>
-              <a:pPr algn="ctr"/>
-              <a:endParaRPr lang="en-US"/>
-            </a:p>
-          </p:txBody>
-        </p:sp>
-        <p:sp>
-          <p:nvSpPr>
-            <p:cNvPr id="6" name="Rectangle 5"/>
-            <p:cNvSpPr/>
-            <p:nvPr/>
-          </p:nvSpPr>
-          <p:spPr>
-            <a:xfrm>
-              <a:off x="1981200" y="2286000"/>
-              <a:ext cx="990600" cy="533400"/>
-            </a:xfrm>
-            <a:prstGeom prst="rect">
-              <a:avLst/>
-            </a:prstGeom>
-            <a:grpFill/>
-            <a:ln>
-              <a:noFill/>
-            </a:ln>
-          </p:spPr>
-          <p:style>
-            <a:lnRef idx="2">
-              <a:schemeClr val="accent1">
-                <a:shade val="50000"/>
-              </a:schemeClr>
-            </a:lnRef>
-            <a:fillRef idx="1">
-              <a:schemeClr val="accent1"/>
-            </a:fillRef>
-            <a:effectRef idx="0">
-              <a:schemeClr val="accent1"/>
-            </a:effectRef>
-            <a:fontRef idx="minor">
-              <a:schemeClr val="lt1"/>
-            </a:fontRef>
-          </p:style>
-          <p:txBody>
-            <a:bodyPr rtlCol="0" anchor="ctr"/>
-            <a:lstStyle/>
-            <a:p>
-              <a:pPr algn="ctr"/>
-              <a:endParaRPr lang="en-US"/>
-            </a:p>
-          </p:txBody>
-        </p:sp>
-        <p:sp>
-          <p:nvSpPr>
-            <p:cNvPr id="7" name="Diagonal Stripe 6"/>
-            <p:cNvSpPr/>
-            <p:nvPr/>
-          </p:nvSpPr>
-          <p:spPr>
-            <a:xfrm rot="973676">
-              <a:off x="2138840" y="2292725"/>
-              <a:ext cx="1790700" cy="533400"/>
-            </a:xfrm>
-            <a:prstGeom prst="diagStripe">
-              <a:avLst>
-                <a:gd name="adj" fmla="val 85295"/>
-              </a:avLst>
-            </a:prstGeom>
-            <a:grpFill/>
-            <a:ln>
-              <a:noFill/>
-            </a:ln>
-          </p:spPr>
-          <p:style>
-            <a:lnRef idx="2">
-              <a:schemeClr val="accent1">
-                <a:shade val="50000"/>
-              </a:schemeClr>
-            </a:lnRef>
-            <a:fillRef idx="1">
-              <a:schemeClr val="accent1"/>
-            </a:fillRef>
-            <a:effectRef idx="0">
-              <a:schemeClr val="accent1"/>
-            </a:effectRef>
-            <a:fontRef idx="minor">
-              <a:schemeClr val="lt1"/>
-            </a:fontRef>
-          </p:style>
-          <p:txBody>
-            <a:bodyPr rtlCol="0" anchor="ctr"/>
-            <a:lstStyle/>
-            <a:p>
-              <a:pPr algn="ctr"/>
-              <a:endParaRPr lang="en-US">
-                <a:solidFill>
-                  <a:schemeClr val="tx1"/>
-                </a:solidFill>
-              </a:endParaRPr>
-            </a:p>
-          </p:txBody>
-        </p:sp>
-        <p:sp>
-          <p:nvSpPr>
-            <p:cNvPr id="8" name="Teardrop 7"/>
-            <p:cNvSpPr/>
-            <p:nvPr/>
-          </p:nvSpPr>
-          <p:spPr>
-            <a:xfrm rot="18653764">
-              <a:off x="3827498" y="2891838"/>
-              <a:ext cx="445486" cy="522576"/>
-            </a:xfrm>
-            <a:prstGeom prst="teardrop">
-              <a:avLst>
-                <a:gd name="adj" fmla="val 143137"/>
-              </a:avLst>
-            </a:prstGeom>
-            <a:grpFill/>
-            <a:ln>
-              <a:noFill/>
-            </a:ln>
-          </p:spPr>
-          <p:style>
-            <a:lnRef idx="2">
-              <a:schemeClr val="accent1">
-                <a:shade val="50000"/>
-              </a:schemeClr>
-            </a:lnRef>
-            <a:fillRef idx="1">
-              <a:schemeClr val="accent1"/>
-            </a:fillRef>
-            <a:effectRef idx="0">
-              <a:schemeClr val="accent1"/>
-            </a:effectRef>
-            <a:fontRef idx="minor">
-              <a:schemeClr val="lt1"/>
-            </a:fontRef>
-          </p:style>
-          <p:txBody>
-            <a:bodyPr rtlCol="0" anchor="ctr"/>
-            <a:lstStyle/>
-            <a:p>
-              <a:pPr algn="ctr"/>
-              <a:endParaRPr lang="en-US"/>
-            </a:p>
-          </p:txBody>
-        </p:sp>
-      </p:grpSp>
       <p:grpSp>
         <p:nvGrpSpPr>
           <p:cNvPr id="22" name="Group 21"/>
@@ -3899,8 +3697,8 @@
         </p:nvGrpSpPr>
         <p:grpSpPr>
           <a:xfrm>
-            <a:off x="924592" y="2329132"/>
-            <a:ext cx="1510803" cy="1063630"/>
+            <a:off x="807350" y="1858256"/>
+            <a:ext cx="950062" cy="668859"/>
             <a:chOff x="2204333" y="3922008"/>
             <a:chExt cx="3813601" cy="1945391"/>
           </a:xfrm>
@@ -6253,6 +6051,269 @@
           </p:sp>
         </p:grpSp>
       </p:grpSp>
+      <p:grpSp>
+        <p:nvGrpSpPr>
+          <p:cNvPr id="5" name="Group 4"/>
+          <p:cNvGrpSpPr/>
+          <p:nvPr/>
+        </p:nvGrpSpPr>
+        <p:grpSpPr>
+          <a:xfrm>
+            <a:off x="-86503" y="1067685"/>
+            <a:ext cx="2282634" cy="747358"/>
+            <a:chOff x="1882094" y="550315"/>
+            <a:chExt cx="2895088" cy="983178"/>
+          </a:xfrm>
+        </p:grpSpPr>
+        <p:grpSp>
+          <p:nvGrpSpPr>
+            <p:cNvPr id="9" name="Group 8"/>
+            <p:cNvGrpSpPr/>
+            <p:nvPr/>
+          </p:nvGrpSpPr>
+          <p:grpSpPr>
+            <a:xfrm rot="20541192">
+              <a:off x="2522670" y="550315"/>
+              <a:ext cx="2254512" cy="894211"/>
+              <a:chOff x="1371600" y="2209800"/>
+              <a:chExt cx="2939929" cy="1166069"/>
+            </a:xfrm>
+            <a:solidFill>
+              <a:schemeClr val="tx1"/>
+            </a:solidFill>
+          </p:grpSpPr>
+          <p:sp>
+            <p:nvSpPr>
+              <p:cNvPr id="4" name="Rectangle 3"/>
+              <p:cNvSpPr/>
+              <p:nvPr/>
+            </p:nvSpPr>
+            <p:spPr>
+              <a:xfrm>
+                <a:off x="1371600" y="2209800"/>
+                <a:ext cx="1447800" cy="685800"/>
+              </a:xfrm>
+              <a:prstGeom prst="rect">
+                <a:avLst/>
+              </a:prstGeom>
+              <a:grpFill/>
+              <a:ln>
+                <a:noFill/>
+              </a:ln>
+            </p:spPr>
+            <p:style>
+              <a:lnRef idx="2">
+                <a:schemeClr val="accent1">
+                  <a:shade val="50000"/>
+                </a:schemeClr>
+              </a:lnRef>
+              <a:fillRef idx="1">
+                <a:schemeClr val="accent1"/>
+              </a:fillRef>
+              <a:effectRef idx="0">
+                <a:schemeClr val="accent1"/>
+              </a:effectRef>
+              <a:fontRef idx="minor">
+                <a:schemeClr val="lt1"/>
+              </a:fontRef>
+            </p:style>
+            <p:txBody>
+              <a:bodyPr rtlCol="0" anchor="ctr"/>
+              <a:lstStyle/>
+              <a:p>
+                <a:pPr algn="ctr"/>
+                <a:endParaRPr lang="en-US"/>
+              </a:p>
+            </p:txBody>
+          </p:sp>
+          <p:sp>
+            <p:nvSpPr>
+              <p:cNvPr id="6" name="Rectangle 5"/>
+              <p:cNvSpPr/>
+              <p:nvPr/>
+            </p:nvSpPr>
+            <p:spPr>
+              <a:xfrm>
+                <a:off x="1981200" y="2286000"/>
+                <a:ext cx="990600" cy="533400"/>
+              </a:xfrm>
+              <a:prstGeom prst="rect">
+                <a:avLst/>
+              </a:prstGeom>
+              <a:grpFill/>
+              <a:ln>
+                <a:noFill/>
+              </a:ln>
+            </p:spPr>
+            <p:style>
+              <a:lnRef idx="2">
+                <a:schemeClr val="accent1">
+                  <a:shade val="50000"/>
+                </a:schemeClr>
+              </a:lnRef>
+              <a:fillRef idx="1">
+                <a:schemeClr val="accent1"/>
+              </a:fillRef>
+              <a:effectRef idx="0">
+                <a:schemeClr val="accent1"/>
+              </a:effectRef>
+              <a:fontRef idx="minor">
+                <a:schemeClr val="lt1"/>
+              </a:fontRef>
+            </p:style>
+            <p:txBody>
+              <a:bodyPr rtlCol="0" anchor="ctr"/>
+              <a:lstStyle/>
+              <a:p>
+                <a:pPr algn="ctr"/>
+                <a:endParaRPr lang="en-US"/>
+              </a:p>
+            </p:txBody>
+          </p:sp>
+          <p:sp>
+            <p:nvSpPr>
+              <p:cNvPr id="7" name="Diagonal Stripe 6"/>
+              <p:cNvSpPr/>
+              <p:nvPr/>
+            </p:nvSpPr>
+            <p:spPr>
+              <a:xfrm rot="973676">
+                <a:off x="2138840" y="2292725"/>
+                <a:ext cx="1790700" cy="533400"/>
+              </a:xfrm>
+              <a:prstGeom prst="diagStripe">
+                <a:avLst>
+                  <a:gd name="adj" fmla="val 85295"/>
+                </a:avLst>
+              </a:prstGeom>
+              <a:grpFill/>
+              <a:ln>
+                <a:noFill/>
+              </a:ln>
+            </p:spPr>
+            <p:style>
+              <a:lnRef idx="2">
+                <a:schemeClr val="accent1">
+                  <a:shade val="50000"/>
+                </a:schemeClr>
+              </a:lnRef>
+              <a:fillRef idx="1">
+                <a:schemeClr val="accent1"/>
+              </a:fillRef>
+              <a:effectRef idx="0">
+                <a:schemeClr val="accent1"/>
+              </a:effectRef>
+              <a:fontRef idx="minor">
+                <a:schemeClr val="lt1"/>
+              </a:fontRef>
+            </p:style>
+            <p:txBody>
+              <a:bodyPr rtlCol="0" anchor="ctr"/>
+              <a:lstStyle/>
+              <a:p>
+                <a:pPr algn="ctr"/>
+                <a:endParaRPr lang="en-US">
+                  <a:solidFill>
+                    <a:schemeClr val="tx1"/>
+                  </a:solidFill>
+                </a:endParaRPr>
+              </a:p>
+            </p:txBody>
+          </p:sp>
+          <p:sp>
+            <p:nvSpPr>
+              <p:cNvPr id="8" name="Teardrop 7"/>
+              <p:cNvSpPr/>
+              <p:nvPr/>
+            </p:nvSpPr>
+            <p:spPr>
+              <a:xfrm rot="18653764">
+                <a:off x="3827498" y="2891838"/>
+                <a:ext cx="445486" cy="522576"/>
+              </a:xfrm>
+              <a:prstGeom prst="teardrop">
+                <a:avLst>
+                  <a:gd name="adj" fmla="val 143137"/>
+                </a:avLst>
+              </a:prstGeom>
+              <a:grpFill/>
+              <a:ln>
+                <a:noFill/>
+              </a:ln>
+            </p:spPr>
+            <p:style>
+              <a:lnRef idx="2">
+                <a:schemeClr val="accent1">
+                  <a:shade val="50000"/>
+                </a:schemeClr>
+              </a:lnRef>
+              <a:fillRef idx="1">
+                <a:schemeClr val="accent1"/>
+              </a:fillRef>
+              <a:effectRef idx="0">
+                <a:schemeClr val="accent1"/>
+              </a:effectRef>
+              <a:fontRef idx="minor">
+                <a:schemeClr val="lt1"/>
+              </a:fontRef>
+            </p:style>
+            <p:txBody>
+              <a:bodyPr rtlCol="0" anchor="ctr"/>
+              <a:lstStyle/>
+              <a:p>
+                <a:pPr algn="ctr"/>
+                <a:endParaRPr lang="en-US"/>
+              </a:p>
+            </p:txBody>
+          </p:sp>
+        </p:grpSp>
+        <p:sp>
+          <p:nvSpPr>
+            <p:cNvPr id="3" name="Rectangle 2"/>
+            <p:cNvSpPr/>
+            <p:nvPr/>
+          </p:nvSpPr>
+          <p:spPr>
+            <a:xfrm rot="20632897">
+              <a:off x="1882094" y="715364"/>
+              <a:ext cx="1116162" cy="818129"/>
+            </a:xfrm>
+            <a:prstGeom prst="rect">
+              <a:avLst/>
+            </a:prstGeom>
+            <a:solidFill>
+              <a:schemeClr val="bg1"/>
+            </a:solidFill>
+            <a:ln>
+              <a:noFill/>
+            </a:ln>
+          </p:spPr>
+          <p:style>
+            <a:lnRef idx="2">
+              <a:schemeClr val="accent1">
+                <a:shade val="50000"/>
+              </a:schemeClr>
+            </a:lnRef>
+            <a:fillRef idx="1">
+              <a:schemeClr val="accent1"/>
+            </a:fillRef>
+            <a:effectRef idx="0">
+              <a:schemeClr val="accent1"/>
+            </a:effectRef>
+            <a:fontRef idx="minor">
+              <a:schemeClr val="lt1"/>
+            </a:fontRef>
+          </p:style>
+          <p:txBody>
+            <a:bodyPr rtlCol="0" anchor="ctr"/>
+            <a:lstStyle/>
+            <a:p>
+              <a:pPr algn="ctr"/>
+              <a:endParaRPr lang="en-US"/>
+            </a:p>
+          </p:txBody>
+        </p:sp>
+      </p:grpSp>
     </p:spTree>
     <p:extLst>
       <p:ext uri="{BB962C8B-B14F-4D97-AF65-F5344CB8AC3E}">

</xml_diff>